<commit_message>
Fixed rural vs urban, updated poster
</commit_message>
<xml_diff>
--- a/Poster/Poster.pptx
+++ b/Poster/Poster.pptx
@@ -272,7 +272,7 @@
           <a:p>
             <a:fld id="{BD1CB04D-1C75-43E0-9B64-B7DDAA42BB2C}" type="datetimeFigureOut">
               <a:rPr lang="en-US" smtClean="0"/>
-              <a:t>3/16/2025</a:t>
+              <a:t>3/17/2025</a:t>
             </a:fld>
             <a:endParaRPr lang="en-US"/>
           </a:p>
@@ -838,7 +838,7 @@
           <a:p>
             <a:fld id="{3F135061-2F74-46D4-9F8F-C77EF304855D}" type="datetimeFigureOut">
               <a:rPr lang="en-US" smtClean="0"/>
-              <a:t>3/16/2025</a:t>
+              <a:t>3/17/2025</a:t>
             </a:fld>
             <a:endParaRPr lang="en-US"/>
           </a:p>
@@ -1008,7 +1008,7 @@
           <a:p>
             <a:fld id="{3F135061-2F74-46D4-9F8F-C77EF304855D}" type="datetimeFigureOut">
               <a:rPr lang="en-US" smtClean="0"/>
-              <a:t>3/16/2025</a:t>
+              <a:t>3/17/2025</a:t>
             </a:fld>
             <a:endParaRPr lang="en-US"/>
           </a:p>
@@ -1188,7 +1188,7 @@
           <a:p>
             <a:fld id="{3F135061-2F74-46D4-9F8F-C77EF304855D}" type="datetimeFigureOut">
               <a:rPr lang="en-US" smtClean="0"/>
-              <a:t>3/16/2025</a:t>
+              <a:t>3/17/2025</a:t>
             </a:fld>
             <a:endParaRPr lang="en-US"/>
           </a:p>
@@ -1358,7 +1358,7 @@
           <a:p>
             <a:fld id="{3F135061-2F74-46D4-9F8F-C77EF304855D}" type="datetimeFigureOut">
               <a:rPr lang="en-US" smtClean="0"/>
-              <a:t>3/16/2025</a:t>
+              <a:t>3/17/2025</a:t>
             </a:fld>
             <a:endParaRPr lang="en-US"/>
           </a:p>
@@ -1602,7 +1602,7 @@
           <a:p>
             <a:fld id="{3F135061-2F74-46D4-9F8F-C77EF304855D}" type="datetimeFigureOut">
               <a:rPr lang="en-US" smtClean="0"/>
-              <a:t>3/16/2025</a:t>
+              <a:t>3/17/2025</a:t>
             </a:fld>
             <a:endParaRPr lang="en-US"/>
           </a:p>
@@ -1834,7 +1834,7 @@
           <a:p>
             <a:fld id="{3F135061-2F74-46D4-9F8F-C77EF304855D}" type="datetimeFigureOut">
               <a:rPr lang="en-US" smtClean="0"/>
-              <a:t>3/16/2025</a:t>
+              <a:t>3/17/2025</a:t>
             </a:fld>
             <a:endParaRPr lang="en-US"/>
           </a:p>
@@ -2201,7 +2201,7 @@
           <a:p>
             <a:fld id="{3F135061-2F74-46D4-9F8F-C77EF304855D}" type="datetimeFigureOut">
               <a:rPr lang="en-US" smtClean="0"/>
-              <a:t>3/16/2025</a:t>
+              <a:t>3/17/2025</a:t>
             </a:fld>
             <a:endParaRPr lang="en-US"/>
           </a:p>
@@ -2319,7 +2319,7 @@
           <a:p>
             <a:fld id="{3F135061-2F74-46D4-9F8F-C77EF304855D}" type="datetimeFigureOut">
               <a:rPr lang="en-US" smtClean="0"/>
-              <a:t>3/16/2025</a:t>
+              <a:t>3/17/2025</a:t>
             </a:fld>
             <a:endParaRPr lang="en-US"/>
           </a:p>
@@ -2414,7 +2414,7 @@
           <a:p>
             <a:fld id="{3F135061-2F74-46D4-9F8F-C77EF304855D}" type="datetimeFigureOut">
               <a:rPr lang="en-US" smtClean="0"/>
-              <a:t>3/16/2025</a:t>
+              <a:t>3/17/2025</a:t>
             </a:fld>
             <a:endParaRPr lang="en-US"/>
           </a:p>
@@ -2691,7 +2691,7 @@
           <a:p>
             <a:fld id="{3F135061-2F74-46D4-9F8F-C77EF304855D}" type="datetimeFigureOut">
               <a:rPr lang="en-US" smtClean="0"/>
-              <a:t>3/16/2025</a:t>
+              <a:t>3/17/2025</a:t>
             </a:fld>
             <a:endParaRPr lang="en-US"/>
           </a:p>
@@ -2948,7 +2948,7 @@
           <a:p>
             <a:fld id="{3F135061-2F74-46D4-9F8F-C77EF304855D}" type="datetimeFigureOut">
               <a:rPr lang="en-US" smtClean="0"/>
-              <a:t>3/16/2025</a:t>
+              <a:t>3/17/2025</a:t>
             </a:fld>
             <a:endParaRPr lang="en-US"/>
           </a:p>
@@ -3161,7 +3161,7 @@
           <a:p>
             <a:fld id="{3F135061-2F74-46D4-9F8F-C77EF304855D}" type="datetimeFigureOut">
               <a:rPr lang="en-US" smtClean="0"/>
-              <a:t>3/16/2025</a:t>
+              <a:t>3/17/2025</a:t>
             </a:fld>
             <a:endParaRPr lang="en-US"/>
           </a:p>
@@ -3816,7 +3816,7 @@
         </p:nvSpPr>
         <p:spPr>
           <a:xfrm>
-            <a:off x="12098224" y="311067"/>
+            <a:off x="11769579" y="187012"/>
             <a:ext cx="25181152" cy="7670240"/>
           </a:xfrm>
         </p:spPr>
@@ -3843,7 +3843,7 @@
                 <a:ea typeface="Roboto" panose="02000000000000000000" pitchFamily="2" charset="0"/>
                 <a:cs typeface="Segoe UI" panose="020B0502040204020203" pitchFamily="34" charset="0"/>
               </a:rPr>
-              <a:t>Urban residence, conservative ideology, higher age and lower levels of education correlate with higher opposition to raising carbon taxes on gas and fossil fuel.</a:t>
+              <a:t>Rural residence, conservative ideology, higher age and lower levels of education correlate with higher opposition to raising carbon taxes on gas and fossil fuel.</a:t>
             </a:r>
           </a:p>
         </p:txBody>
@@ -3903,7 +3903,7 @@
                 <a:latin typeface="Lato" panose="020F0502020204030203" pitchFamily="34" charset="0"/>
                 <a:cs typeface="Segoe UI" panose="020B0502040204020203" pitchFamily="34" charset="0"/>
               </a:rPr>
-              <a:t>Carbon taxes are a key policy tool used to reduce greenhouse gas emissions by placing a financial cost on fossil fuel consumption. Advocates argue that such taxes encourage cleaner energy use and help combat climate change, while opponents criticize them for increasing living costs, particularly for lower-income households. In Canada, carbon pricing has been a highly debated issue, with campaigns like "Axe the Tax" reflecting strong opposition in certain regions.</a:t>
+              <a:t>Carbon taxes are a key policy tool used to reduce greenhouse gas emissions by placing a financial cost on fossil fuel consumption. Advocates argue that such taxes encourage cleaner energy use and help combat climate change [1], while opponents criticize them for increasing living costs, particularly for lower-income households [2]. In Canada, carbon pricing has been a highly debated issue, with campaigns like "Axe the Tax" reflecting strong opposition in certain regions [3].</a:t>
             </a:r>
           </a:p>
           <a:p>
@@ -3928,7 +3928,7 @@
                 <a:latin typeface="Lato" panose="020F0502020204030203" pitchFamily="34" charset="0"/>
                 <a:cs typeface="Segoe UI" panose="020B0502040204020203" pitchFamily="34" charset="0"/>
               </a:rPr>
-              <a:t>The TISP dataset is a 2022 collection of questionnaire responses from 71 922 participants in 68 countries, offering insight on public attitudes towards science and climate change. </a:t>
+              <a:t>The TISP dataset is a 2022 collection of questionnaire responses from 71 922 participants in 68 countries, offering insight on public attitudes towards science and climate change [4]. </a:t>
             </a:r>
           </a:p>
           <a:p>
@@ -4078,7 +4078,7 @@
                 <a:latin typeface="Lato" panose="020F0502020204030203" pitchFamily="34" charset="0"/>
                 <a:cs typeface="Segoe UI" panose="020B0502040204020203" pitchFamily="34" charset="0"/>
               </a:rPr>
-              <a:t>Support for increasing carbon tax is an ordinal variable, so nonparametric statistical tests were used.</a:t>
+              <a:t>Data analysis and visualization was performed in Python using the Scipy and Matplotlib libraries.</a:t>
             </a:r>
           </a:p>
           <a:p>
@@ -4463,7 +4463,7 @@
                 <a:latin typeface="Lato" panose="020F0502020204030203" pitchFamily="34" charset="0"/>
                 <a:cs typeface="Segoe UI" panose="020B0502040204020203" pitchFamily="34" charset="0"/>
               </a:rPr>
-              <a:t>What individual factors correlate with Canadian’s opposition to raising carbon taxes on gas and fossil fuels or coal?</a:t>
+              <a:t>What individual factors correlate with Canadians’ opposition to raising carbon taxes on gas and fossil fuels or coal?</a:t>
             </a:r>
           </a:p>
           <a:p>
@@ -4772,7 +4772,7 @@
         </p:nvSpPr>
         <p:spPr>
           <a:xfrm>
-            <a:off x="12025509" y="17518743"/>
+            <a:off x="12448935" y="17794694"/>
             <a:ext cx="24730363" cy="1323439"/>
           </a:xfrm>
           <a:prstGeom prst="rect">
@@ -4789,21 +4789,18 @@
             <a:r>
               <a:rPr lang="en-US" sz="8000" b="1" dirty="0">
                 <a:solidFill>
-                  <a:srgbClr val="002060"/>
+                  <a:srgbClr val="F48F31"/>
                 </a:solidFill>
-                <a:highlight>
-                  <a:srgbClr val="E1F1F4"/>
-                </a:highlight>
                 <a:latin typeface="Lato" panose="020F0502020204030203" pitchFamily="34" charset="0"/>
                 <a:ea typeface="Roboto" panose="02000000000000000000" pitchFamily="2" charset="0"/>
                 <a:cs typeface="Segoe UI" panose="020B0502040204020203" pitchFamily="34" charset="0"/>
               </a:rPr>
-              <a:t>Conservative ideology has the strongest correlation</a:t>
+              <a:t>Conservative ideology has the strongest correlation:</a:t>
             </a:r>
             <a:endParaRPr lang="en-CA" sz="1400" dirty="0">
-              <a:highlight>
-                <a:srgbClr val="E1F1F4"/>
-              </a:highlight>
+              <a:solidFill>
+                <a:srgbClr val="F48F31"/>
+              </a:solidFill>
             </a:endParaRPr>
           </a:p>
         </p:txBody>
@@ -5466,8 +5463,8 @@
         </p:blipFill>
         <p:spPr>
           <a:xfrm>
-            <a:off x="11601774" y="18463910"/>
-            <a:ext cx="26121905" cy="14344134"/>
+            <a:off x="12130162" y="19118133"/>
+            <a:ext cx="24898586" cy="13672382"/>
           </a:xfrm>
           <a:prstGeom prst="rect">
             <a:avLst/>
@@ -5931,10 +5928,10 @@
       </p:pic>
       <p:pic>
         <p:nvPicPr>
-          <p:cNvPr id="1036" name="Picture 1035" descr="A graph of a number of people&#10;&#10;AI-generated content may be incorrect.">
+          <p:cNvPr id="1038" name="Picture 1037" descr="A graph of a number of colored squares&#10;&#10;AI-generated content may be incorrect.">
             <a:extLst>
               <a:ext uri="{FF2B5EF4-FFF2-40B4-BE49-F238E27FC236}">
-                <a16:creationId xmlns:a16="http://schemas.microsoft.com/office/drawing/2014/main" id="{8652F0D9-C62A-146C-DCAF-C6A18155A044}"/>
+                <a16:creationId xmlns:a16="http://schemas.microsoft.com/office/drawing/2014/main" id="{BA4FFFF8-4EF5-4052-4926-0525CAE4ABC8}"/>
               </a:ext>
             </a:extLst>
           </p:cNvPr>
@@ -5957,8 +5954,8 @@
         </p:blipFill>
         <p:spPr>
           <a:xfrm>
-            <a:off x="38104200" y="1087840"/>
-            <a:ext cx="5904987" cy="6607092"/>
+            <a:off x="38221356" y="7501440"/>
+            <a:ext cx="10996894" cy="6281734"/>
           </a:xfrm>
           <a:prstGeom prst="rect">
             <a:avLst/>
@@ -5967,10 +5964,10 @@
       </p:pic>
       <p:pic>
         <p:nvPicPr>
-          <p:cNvPr id="1038" name="Picture 1037" descr="A graph of a number of colored squares&#10;&#10;AI-generated content may be incorrect.">
+          <p:cNvPr id="1040" name="Picture 1039" descr="A graph of different colored squares&#10;&#10;AI-generated content may be incorrect.">
             <a:extLst>
               <a:ext uri="{FF2B5EF4-FFF2-40B4-BE49-F238E27FC236}">
-                <a16:creationId xmlns:a16="http://schemas.microsoft.com/office/drawing/2014/main" id="{BA4FFFF8-4EF5-4052-4926-0525CAE4ABC8}"/>
+                <a16:creationId xmlns:a16="http://schemas.microsoft.com/office/drawing/2014/main" id="{7C40B2B7-D252-7D41-67F1-3B4A594314FD}"/>
               </a:ext>
             </a:extLst>
           </p:cNvPr>
@@ -5993,7 +5990,7 @@
         </p:blipFill>
         <p:spPr>
           <a:xfrm>
-            <a:off x="38158597" y="7670240"/>
+            <a:off x="38221356" y="13879849"/>
             <a:ext cx="10996894" cy="6281734"/>
           </a:xfrm>
           <a:prstGeom prst="rect">
@@ -6003,10 +6000,10 @@
       </p:pic>
       <p:pic>
         <p:nvPicPr>
-          <p:cNvPr id="1040" name="Picture 1039" descr="A graph of different colored squares&#10;&#10;AI-generated content may be incorrect.">
+          <p:cNvPr id="6" name="Picture 5" descr="A graph of a number of people&#10;&#10;AI-generated content may be incorrect.">
             <a:extLst>
               <a:ext uri="{FF2B5EF4-FFF2-40B4-BE49-F238E27FC236}">
-                <a16:creationId xmlns:a16="http://schemas.microsoft.com/office/drawing/2014/main" id="{7C40B2B7-D252-7D41-67F1-3B4A594314FD}"/>
+                <a16:creationId xmlns:a16="http://schemas.microsoft.com/office/drawing/2014/main" id="{95727EC7-41E2-235A-DD4B-3020B0184C16}"/>
               </a:ext>
             </a:extLst>
           </p:cNvPr>
@@ -6029,8 +6026,8 @@
         </p:blipFill>
         <p:spPr>
           <a:xfrm>
-            <a:off x="38221356" y="13879849"/>
-            <a:ext cx="10996894" cy="6281734"/>
+            <a:off x="38402310" y="1123032"/>
+            <a:ext cx="5614203" cy="6281733"/>
           </a:xfrm>
           <a:prstGeom prst="rect">
             <a:avLst/>

</xml_diff>